<commit_message>
Add animations to L11
</commit_message>
<xml_diff>
--- a/docs/L11-streaming.pptx
+++ b/docs/L11-streaming.pptx
@@ -5235,6 +5235,13 @@
   <p:clrMapOvr>
     <a:masterClrMapping/>
   </p:clrMapOvr>
+  <p:timing>
+    <p:tnLst>
+      <p:par>
+        <p:cTn id="1" dur="indefinite" restart="never" nodeType="tmRoot"/>
+      </p:par>
+    </p:tnLst>
+  </p:timing>
 </p:sld>
 </file>
 
@@ -5341,6 +5348,13 @@
   <p:clrMapOvr>
     <a:masterClrMapping/>
   </p:clrMapOvr>
+  <p:timing>
+    <p:tnLst>
+      <p:par>
+        <p:cTn id="1" dur="indefinite" restart="never" nodeType="tmRoot"/>
+      </p:par>
+    </p:tnLst>
+  </p:timing>
 </p:sld>
 </file>
 
@@ -5515,9 +5529,280 @@
   <p:timing>
     <p:tnLst>
       <p:par>
-        <p:cTn id="1" dur="indefinite" restart="never" nodeType="tmRoot"/>
+        <p:cTn id="1" dur="indefinite" restart="never" nodeType="tmRoot">
+          <p:childTnLst>
+            <p:seq concurrent="1" nextAc="seek">
+              <p:cTn id="2" dur="indefinite" nodeType="mainSeq">
+                <p:childTnLst>
+                  <p:par>
+                    <p:cTn id="3" fill="hold">
+                      <p:stCondLst>
+                        <p:cond delay="indefinite"/>
+                      </p:stCondLst>
+                      <p:childTnLst>
+                        <p:par>
+                          <p:cTn id="4" fill="hold">
+                            <p:stCondLst>
+                              <p:cond delay="0"/>
+                            </p:stCondLst>
+                            <p:childTnLst>
+                              <p:par>
+                                <p:cTn id="5" presetID="1" presetClass="entr" presetSubtype="0" fill="hold" grpId="0" nodeType="clickEffect">
+                                  <p:stCondLst>
+                                    <p:cond delay="0"/>
+                                  </p:stCondLst>
+                                  <p:childTnLst>
+                                    <p:set>
+                                      <p:cBhvr>
+                                        <p:cTn id="6" dur="1" fill="hold">
+                                          <p:stCondLst>
+                                            <p:cond delay="0"/>
+                                          </p:stCondLst>
+                                        </p:cTn>
+                                        <p:tgtEl>
+                                          <p:spTgt spid="2">
+                                            <p:txEl>
+                                              <p:pRg st="0" end="0"/>
+                                            </p:txEl>
+                                          </p:spTgt>
+                                        </p:tgtEl>
+                                        <p:attrNameLst>
+                                          <p:attrName>style.visibility</p:attrName>
+                                        </p:attrNameLst>
+                                      </p:cBhvr>
+                                      <p:to>
+                                        <p:strVal val="visible"/>
+                                      </p:to>
+                                    </p:set>
+                                  </p:childTnLst>
+                                </p:cTn>
+                              </p:par>
+                            </p:childTnLst>
+                          </p:cTn>
+                        </p:par>
+                      </p:childTnLst>
+                    </p:cTn>
+                  </p:par>
+                  <p:par>
+                    <p:cTn id="7" fill="hold">
+                      <p:stCondLst>
+                        <p:cond delay="indefinite"/>
+                      </p:stCondLst>
+                      <p:childTnLst>
+                        <p:par>
+                          <p:cTn id="8" fill="hold">
+                            <p:stCondLst>
+                              <p:cond delay="0"/>
+                            </p:stCondLst>
+                            <p:childTnLst>
+                              <p:par>
+                                <p:cTn id="9" presetID="1" presetClass="entr" presetSubtype="0" fill="hold" grpId="0" nodeType="clickEffect">
+                                  <p:stCondLst>
+                                    <p:cond delay="0"/>
+                                  </p:stCondLst>
+                                  <p:childTnLst>
+                                    <p:set>
+                                      <p:cBhvr>
+                                        <p:cTn id="10" dur="1" fill="hold">
+                                          <p:stCondLst>
+                                            <p:cond delay="0"/>
+                                          </p:stCondLst>
+                                        </p:cTn>
+                                        <p:tgtEl>
+                                          <p:spTgt spid="2">
+                                            <p:txEl>
+                                              <p:pRg st="1" end="1"/>
+                                            </p:txEl>
+                                          </p:spTgt>
+                                        </p:tgtEl>
+                                        <p:attrNameLst>
+                                          <p:attrName>style.visibility</p:attrName>
+                                        </p:attrNameLst>
+                                      </p:cBhvr>
+                                      <p:to>
+                                        <p:strVal val="visible"/>
+                                      </p:to>
+                                    </p:set>
+                                  </p:childTnLst>
+                                </p:cTn>
+                              </p:par>
+                            </p:childTnLst>
+                          </p:cTn>
+                        </p:par>
+                      </p:childTnLst>
+                    </p:cTn>
+                  </p:par>
+                  <p:par>
+                    <p:cTn id="11" fill="hold">
+                      <p:stCondLst>
+                        <p:cond delay="indefinite"/>
+                      </p:stCondLst>
+                      <p:childTnLst>
+                        <p:par>
+                          <p:cTn id="12" fill="hold">
+                            <p:stCondLst>
+                              <p:cond delay="0"/>
+                            </p:stCondLst>
+                            <p:childTnLst>
+                              <p:par>
+                                <p:cTn id="13" presetID="1" presetClass="entr" presetSubtype="0" fill="hold" grpId="0" nodeType="clickEffect">
+                                  <p:stCondLst>
+                                    <p:cond delay="0"/>
+                                  </p:stCondLst>
+                                  <p:childTnLst>
+                                    <p:set>
+                                      <p:cBhvr>
+                                        <p:cTn id="14" dur="1" fill="hold">
+                                          <p:stCondLst>
+                                            <p:cond delay="0"/>
+                                          </p:stCondLst>
+                                        </p:cTn>
+                                        <p:tgtEl>
+                                          <p:spTgt spid="2">
+                                            <p:txEl>
+                                              <p:pRg st="2" end="2"/>
+                                            </p:txEl>
+                                          </p:spTgt>
+                                        </p:tgtEl>
+                                        <p:attrNameLst>
+                                          <p:attrName>style.visibility</p:attrName>
+                                        </p:attrNameLst>
+                                      </p:cBhvr>
+                                      <p:to>
+                                        <p:strVal val="visible"/>
+                                      </p:to>
+                                    </p:set>
+                                  </p:childTnLst>
+                                </p:cTn>
+                              </p:par>
+                            </p:childTnLst>
+                          </p:cTn>
+                        </p:par>
+                      </p:childTnLst>
+                    </p:cTn>
+                  </p:par>
+                  <p:par>
+                    <p:cTn id="15" fill="hold">
+                      <p:stCondLst>
+                        <p:cond delay="indefinite"/>
+                      </p:stCondLst>
+                      <p:childTnLst>
+                        <p:par>
+                          <p:cTn id="16" fill="hold">
+                            <p:stCondLst>
+                              <p:cond delay="0"/>
+                            </p:stCondLst>
+                            <p:childTnLst>
+                              <p:par>
+                                <p:cTn id="17" presetID="1" presetClass="entr" presetSubtype="0" fill="hold" grpId="0" nodeType="clickEffect">
+                                  <p:stCondLst>
+                                    <p:cond delay="0"/>
+                                  </p:stCondLst>
+                                  <p:childTnLst>
+                                    <p:set>
+                                      <p:cBhvr>
+                                        <p:cTn id="18" dur="1" fill="hold">
+                                          <p:stCondLst>
+                                            <p:cond delay="0"/>
+                                          </p:stCondLst>
+                                        </p:cTn>
+                                        <p:tgtEl>
+                                          <p:spTgt spid="2">
+                                            <p:txEl>
+                                              <p:pRg st="3" end="3"/>
+                                            </p:txEl>
+                                          </p:spTgt>
+                                        </p:tgtEl>
+                                        <p:attrNameLst>
+                                          <p:attrName>style.visibility</p:attrName>
+                                        </p:attrNameLst>
+                                      </p:cBhvr>
+                                      <p:to>
+                                        <p:strVal val="visible"/>
+                                      </p:to>
+                                    </p:set>
+                                  </p:childTnLst>
+                                </p:cTn>
+                              </p:par>
+                            </p:childTnLst>
+                          </p:cTn>
+                        </p:par>
+                      </p:childTnLst>
+                    </p:cTn>
+                  </p:par>
+                  <p:par>
+                    <p:cTn id="19" fill="hold">
+                      <p:stCondLst>
+                        <p:cond delay="indefinite"/>
+                      </p:stCondLst>
+                      <p:childTnLst>
+                        <p:par>
+                          <p:cTn id="20" fill="hold">
+                            <p:stCondLst>
+                              <p:cond delay="0"/>
+                            </p:stCondLst>
+                            <p:childTnLst>
+                              <p:par>
+                                <p:cTn id="21" presetID="1" presetClass="entr" presetSubtype="0" fill="hold" grpId="0" nodeType="clickEffect">
+                                  <p:stCondLst>
+                                    <p:cond delay="0"/>
+                                  </p:stCondLst>
+                                  <p:childTnLst>
+                                    <p:set>
+                                      <p:cBhvr>
+                                        <p:cTn id="22" dur="1" fill="hold">
+                                          <p:stCondLst>
+                                            <p:cond delay="0"/>
+                                          </p:stCondLst>
+                                        </p:cTn>
+                                        <p:tgtEl>
+                                          <p:spTgt spid="2">
+                                            <p:txEl>
+                                              <p:pRg st="5" end="5"/>
+                                            </p:txEl>
+                                          </p:spTgt>
+                                        </p:tgtEl>
+                                        <p:attrNameLst>
+                                          <p:attrName>style.visibility</p:attrName>
+                                        </p:attrNameLst>
+                                      </p:cBhvr>
+                                      <p:to>
+                                        <p:strVal val="visible"/>
+                                      </p:to>
+                                    </p:set>
+                                  </p:childTnLst>
+                                </p:cTn>
+                              </p:par>
+                            </p:childTnLst>
+                          </p:cTn>
+                        </p:par>
+                      </p:childTnLst>
+                    </p:cTn>
+                  </p:par>
+                </p:childTnLst>
+              </p:cTn>
+              <p:prevCondLst>
+                <p:cond evt="onPrev" delay="0">
+                  <p:tgtEl>
+                    <p:sldTgt/>
+                  </p:tgtEl>
+                </p:cond>
+              </p:prevCondLst>
+              <p:nextCondLst>
+                <p:cond evt="onNext" delay="0">
+                  <p:tgtEl>
+                    <p:sldTgt/>
+                  </p:tgtEl>
+                </p:cond>
+              </p:nextCondLst>
+            </p:seq>
+          </p:childTnLst>
+        </p:cTn>
       </p:par>
     </p:tnLst>
+    <p:bldLst>
+      <p:bldP spid="2" grpId="0" build="p"/>
+    </p:bldLst>
   </p:timing>
 </p:sld>
 </file>
@@ -5772,9 +6057,182 @@
   <p:timing>
     <p:tnLst>
       <p:par>
-        <p:cTn id="1" dur="indefinite" restart="never" nodeType="tmRoot"/>
+        <p:cTn id="1" dur="indefinite" restart="never" nodeType="tmRoot">
+          <p:childTnLst>
+            <p:seq concurrent="1" nextAc="seek">
+              <p:cTn id="2" dur="indefinite" nodeType="mainSeq">
+                <p:childTnLst>
+                  <p:par>
+                    <p:cTn id="3" fill="hold">
+                      <p:stCondLst>
+                        <p:cond delay="indefinite"/>
+                      </p:stCondLst>
+                      <p:childTnLst>
+                        <p:par>
+                          <p:cTn id="4" fill="hold">
+                            <p:stCondLst>
+                              <p:cond delay="0"/>
+                            </p:stCondLst>
+                            <p:childTnLst>
+                              <p:par>
+                                <p:cTn id="5" presetID="1" presetClass="entr" presetSubtype="0" fill="hold" grpId="0" nodeType="clickEffect">
+                                  <p:stCondLst>
+                                    <p:cond delay="0"/>
+                                  </p:stCondLst>
+                                  <p:childTnLst>
+                                    <p:set>
+                                      <p:cBhvr>
+                                        <p:cTn id="6" dur="1" fill="hold">
+                                          <p:stCondLst>
+                                            <p:cond delay="0"/>
+                                          </p:stCondLst>
+                                        </p:cTn>
+                                        <p:tgtEl>
+                                          <p:spTgt spid="2">
+                                            <p:txEl>
+                                              <p:pRg st="0" end="0"/>
+                                            </p:txEl>
+                                          </p:spTgt>
+                                        </p:tgtEl>
+                                        <p:attrNameLst>
+                                          <p:attrName>style.visibility</p:attrName>
+                                        </p:attrNameLst>
+                                      </p:cBhvr>
+                                      <p:to>
+                                        <p:strVal val="visible"/>
+                                      </p:to>
+                                    </p:set>
+                                  </p:childTnLst>
+                                </p:cTn>
+                              </p:par>
+                            </p:childTnLst>
+                          </p:cTn>
+                        </p:par>
+                      </p:childTnLst>
+                    </p:cTn>
+                  </p:par>
+                  <p:par>
+                    <p:cTn id="7" fill="hold">
+                      <p:stCondLst>
+                        <p:cond delay="indefinite"/>
+                      </p:stCondLst>
+                      <p:childTnLst>
+                        <p:par>
+                          <p:cTn id="8" fill="hold">
+                            <p:stCondLst>
+                              <p:cond delay="0"/>
+                            </p:stCondLst>
+                            <p:childTnLst>
+                              <p:par>
+                                <p:cTn id="9" presetID="1" presetClass="entr" presetSubtype="0" fill="hold" grpId="0" nodeType="clickEffect">
+                                  <p:stCondLst>
+                                    <p:cond delay="0"/>
+                                  </p:stCondLst>
+                                  <p:childTnLst>
+                                    <p:set>
+                                      <p:cBhvr>
+                                        <p:cTn id="10" dur="1" fill="hold">
+                                          <p:stCondLst>
+                                            <p:cond delay="0"/>
+                                          </p:stCondLst>
+                                        </p:cTn>
+                                        <p:tgtEl>
+                                          <p:spTgt spid="2">
+                                            <p:txEl>
+                                              <p:pRg st="1" end="1"/>
+                                            </p:txEl>
+                                          </p:spTgt>
+                                        </p:tgtEl>
+                                        <p:attrNameLst>
+                                          <p:attrName>style.visibility</p:attrName>
+                                        </p:attrNameLst>
+                                      </p:cBhvr>
+                                      <p:to>
+                                        <p:strVal val="visible"/>
+                                      </p:to>
+                                    </p:set>
+                                  </p:childTnLst>
+                                </p:cTn>
+                              </p:par>
+                            </p:childTnLst>
+                          </p:cTn>
+                        </p:par>
+                      </p:childTnLst>
+                    </p:cTn>
+                  </p:par>
+                  <p:par>
+                    <p:cTn id="11" fill="hold">
+                      <p:stCondLst>
+                        <p:cond delay="indefinite"/>
+                      </p:stCondLst>
+                      <p:childTnLst>
+                        <p:par>
+                          <p:cTn id="12" fill="hold">
+                            <p:stCondLst>
+                              <p:cond delay="0"/>
+                            </p:stCondLst>
+                            <p:childTnLst>
+                              <p:par>
+                                <p:cTn id="13" presetID="1" presetClass="entr" presetSubtype="0" fill="hold" grpId="0" nodeType="clickEffect">
+                                  <p:stCondLst>
+                                    <p:cond delay="0"/>
+                                  </p:stCondLst>
+                                  <p:childTnLst>
+                                    <p:set>
+                                      <p:cBhvr>
+                                        <p:cTn id="14" dur="1" fill="hold">
+                                          <p:stCondLst>
+                                            <p:cond delay="0"/>
+                                          </p:stCondLst>
+                                        </p:cTn>
+                                        <p:tgtEl>
+                                          <p:spTgt spid="2">
+                                            <p:txEl>
+                                              <p:pRg st="2" end="2"/>
+                                            </p:txEl>
+                                          </p:spTgt>
+                                        </p:tgtEl>
+                                        <p:attrNameLst>
+                                          <p:attrName>style.visibility</p:attrName>
+                                        </p:attrNameLst>
+                                      </p:cBhvr>
+                                      <p:to>
+                                        <p:strVal val="visible"/>
+                                      </p:to>
+                                    </p:set>
+                                  </p:childTnLst>
+                                </p:cTn>
+                              </p:par>
+                            </p:childTnLst>
+                          </p:cTn>
+                        </p:par>
+                      </p:childTnLst>
+                    </p:cTn>
+                  </p:par>
+                </p:childTnLst>
+              </p:cTn>
+              <p:prevCondLst>
+                <p:cond evt="onPrev" delay="0">
+                  <p:tgtEl>
+                    <p:sldTgt/>
+                  </p:tgtEl>
+                </p:cond>
+              </p:prevCondLst>
+              <p:nextCondLst>
+                <p:cond evt="onNext" delay="0">
+                  <p:tgtEl>
+                    <p:sldTgt/>
+                  </p:tgtEl>
+                </p:cond>
+              </p:nextCondLst>
+            </p:seq>
+          </p:childTnLst>
+        </p:cTn>
       </p:par>
     </p:tnLst>
+    <p:bldLst>
+      <p:bldP spid="2" grpId="0" build="p"/>
+    </p:bldLst>
   </p:timing>
 </p:sld>
 </file>
@@ -6019,9 +6477,133 @@
   <p:timing>
     <p:tnLst>
       <p:par>
-        <p:cTn id="1" dur="indefinite" restart="never" nodeType="tmRoot"/>
+        <p:cTn id="1" dur="indefinite" restart="never" nodeType="tmRoot">
+          <p:childTnLst>
+            <p:seq concurrent="1" nextAc="seek">
+              <p:cTn id="2" dur="indefinite" nodeType="mainSeq">
+                <p:childTnLst>
+                  <p:par>
+                    <p:cTn id="3" fill="hold">
+                      <p:stCondLst>
+                        <p:cond delay="indefinite"/>
+                      </p:stCondLst>
+                      <p:childTnLst>
+                        <p:par>
+                          <p:cTn id="4" fill="hold">
+                            <p:stCondLst>
+                              <p:cond delay="0"/>
+                            </p:stCondLst>
+                            <p:childTnLst>
+                              <p:par>
+                                <p:cTn id="5" presetID="1" presetClass="entr" presetSubtype="0" fill="hold" grpId="0" nodeType="clickEffect">
+                                  <p:stCondLst>
+                                    <p:cond delay="0"/>
+                                  </p:stCondLst>
+                                  <p:childTnLst>
+                                    <p:set>
+                                      <p:cBhvr>
+                                        <p:cTn id="6" dur="1" fill="hold">
+                                          <p:stCondLst>
+                                            <p:cond delay="0"/>
+                                          </p:stCondLst>
+                                        </p:cTn>
+                                        <p:tgtEl>
+                                          <p:spTgt spid="2">
+                                            <p:txEl>
+                                              <p:pRg st="0" end="0"/>
+                                            </p:txEl>
+                                          </p:spTgt>
+                                        </p:tgtEl>
+                                        <p:attrNameLst>
+                                          <p:attrName>style.visibility</p:attrName>
+                                        </p:attrNameLst>
+                                      </p:cBhvr>
+                                      <p:to>
+                                        <p:strVal val="visible"/>
+                                      </p:to>
+                                    </p:set>
+                                  </p:childTnLst>
+                                </p:cTn>
+                              </p:par>
+                            </p:childTnLst>
+                          </p:cTn>
+                        </p:par>
+                      </p:childTnLst>
+                    </p:cTn>
+                  </p:par>
+                  <p:par>
+                    <p:cTn id="7" fill="hold">
+                      <p:stCondLst>
+                        <p:cond delay="indefinite"/>
+                      </p:stCondLst>
+                      <p:childTnLst>
+                        <p:par>
+                          <p:cTn id="8" fill="hold">
+                            <p:stCondLst>
+                              <p:cond delay="0"/>
+                            </p:stCondLst>
+                            <p:childTnLst>
+                              <p:par>
+                                <p:cTn id="9" presetID="1" presetClass="entr" presetSubtype="0" fill="hold" grpId="0" nodeType="clickEffect">
+                                  <p:stCondLst>
+                                    <p:cond delay="0"/>
+                                  </p:stCondLst>
+                                  <p:childTnLst>
+                                    <p:set>
+                                      <p:cBhvr>
+                                        <p:cTn id="10" dur="1" fill="hold">
+                                          <p:stCondLst>
+                                            <p:cond delay="0"/>
+                                          </p:stCondLst>
+                                        </p:cTn>
+                                        <p:tgtEl>
+                                          <p:spTgt spid="2">
+                                            <p:txEl>
+                                              <p:pRg st="1" end="1"/>
+                                            </p:txEl>
+                                          </p:spTgt>
+                                        </p:tgtEl>
+                                        <p:attrNameLst>
+                                          <p:attrName>style.visibility</p:attrName>
+                                        </p:attrNameLst>
+                                      </p:cBhvr>
+                                      <p:to>
+                                        <p:strVal val="visible"/>
+                                      </p:to>
+                                    </p:set>
+                                  </p:childTnLst>
+                                </p:cTn>
+                              </p:par>
+                            </p:childTnLst>
+                          </p:cTn>
+                        </p:par>
+                      </p:childTnLst>
+                    </p:cTn>
+                  </p:par>
+                </p:childTnLst>
+              </p:cTn>
+              <p:prevCondLst>
+                <p:cond evt="onPrev" delay="0">
+                  <p:tgtEl>
+                    <p:sldTgt/>
+                  </p:tgtEl>
+                </p:cond>
+              </p:prevCondLst>
+              <p:nextCondLst>
+                <p:cond evt="onNext" delay="0">
+                  <p:tgtEl>
+                    <p:sldTgt/>
+                  </p:tgtEl>
+                </p:cond>
+              </p:nextCondLst>
+            </p:seq>
+          </p:childTnLst>
+        </p:cTn>
       </p:par>
     </p:tnLst>
+    <p:bldLst>
+      <p:bldP spid="2" grpId="0" build="p"/>
+    </p:bldLst>
   </p:timing>
 </p:sld>
 </file>
@@ -6181,9 +6763,231 @@
   <p:timing>
     <p:tnLst>
       <p:par>
-        <p:cTn id="1" dur="indefinite" restart="never" nodeType="tmRoot"/>
+        <p:cTn id="1" dur="indefinite" restart="never" nodeType="tmRoot">
+          <p:childTnLst>
+            <p:seq concurrent="1" nextAc="seek">
+              <p:cTn id="2" dur="indefinite" nodeType="mainSeq">
+                <p:childTnLst>
+                  <p:par>
+                    <p:cTn id="3" fill="hold">
+                      <p:stCondLst>
+                        <p:cond delay="indefinite"/>
+                      </p:stCondLst>
+                      <p:childTnLst>
+                        <p:par>
+                          <p:cTn id="4" fill="hold">
+                            <p:stCondLst>
+                              <p:cond delay="0"/>
+                            </p:stCondLst>
+                            <p:childTnLst>
+                              <p:par>
+                                <p:cTn id="5" presetID="1" presetClass="entr" presetSubtype="0" fill="hold" grpId="0" nodeType="clickEffect">
+                                  <p:stCondLst>
+                                    <p:cond delay="0"/>
+                                  </p:stCondLst>
+                                  <p:childTnLst>
+                                    <p:set>
+                                      <p:cBhvr>
+                                        <p:cTn id="6" dur="1" fill="hold">
+                                          <p:stCondLst>
+                                            <p:cond delay="0"/>
+                                          </p:stCondLst>
+                                        </p:cTn>
+                                        <p:tgtEl>
+                                          <p:spTgt spid="2">
+                                            <p:txEl>
+                                              <p:pRg st="0" end="0"/>
+                                            </p:txEl>
+                                          </p:spTgt>
+                                        </p:tgtEl>
+                                        <p:attrNameLst>
+                                          <p:attrName>style.visibility</p:attrName>
+                                        </p:attrNameLst>
+                                      </p:cBhvr>
+                                      <p:to>
+                                        <p:strVal val="visible"/>
+                                      </p:to>
+                                    </p:set>
+                                  </p:childTnLst>
+                                </p:cTn>
+                              </p:par>
+                            </p:childTnLst>
+                          </p:cTn>
+                        </p:par>
+                      </p:childTnLst>
+                    </p:cTn>
+                  </p:par>
+                  <p:par>
+                    <p:cTn id="7" fill="hold">
+                      <p:stCondLst>
+                        <p:cond delay="indefinite"/>
+                      </p:stCondLst>
+                      <p:childTnLst>
+                        <p:par>
+                          <p:cTn id="8" fill="hold">
+                            <p:stCondLst>
+                              <p:cond delay="0"/>
+                            </p:stCondLst>
+                            <p:childTnLst>
+                              <p:par>
+                                <p:cTn id="9" presetID="1" presetClass="entr" presetSubtype="0" fill="hold" grpId="0" nodeType="clickEffect">
+                                  <p:stCondLst>
+                                    <p:cond delay="0"/>
+                                  </p:stCondLst>
+                                  <p:childTnLst>
+                                    <p:set>
+                                      <p:cBhvr>
+                                        <p:cTn id="10" dur="1" fill="hold">
+                                          <p:stCondLst>
+                                            <p:cond delay="0"/>
+                                          </p:stCondLst>
+                                        </p:cTn>
+                                        <p:tgtEl>
+                                          <p:spTgt spid="2">
+                                            <p:txEl>
+                                              <p:pRg st="1" end="1"/>
+                                            </p:txEl>
+                                          </p:spTgt>
+                                        </p:tgtEl>
+                                        <p:attrNameLst>
+                                          <p:attrName>style.visibility</p:attrName>
+                                        </p:attrNameLst>
+                                      </p:cBhvr>
+                                      <p:to>
+                                        <p:strVal val="visible"/>
+                                      </p:to>
+                                    </p:set>
+                                  </p:childTnLst>
+                                </p:cTn>
+                              </p:par>
+                            </p:childTnLst>
+                          </p:cTn>
+                        </p:par>
+                      </p:childTnLst>
+                    </p:cTn>
+                  </p:par>
+                  <p:par>
+                    <p:cTn id="11" fill="hold">
+                      <p:stCondLst>
+                        <p:cond delay="indefinite"/>
+                      </p:stCondLst>
+                      <p:childTnLst>
+                        <p:par>
+                          <p:cTn id="12" fill="hold">
+                            <p:stCondLst>
+                              <p:cond delay="0"/>
+                            </p:stCondLst>
+                            <p:childTnLst>
+                              <p:par>
+                                <p:cTn id="13" presetID="1" presetClass="entr" presetSubtype="0" fill="hold" grpId="0" nodeType="clickEffect">
+                                  <p:stCondLst>
+                                    <p:cond delay="0"/>
+                                  </p:stCondLst>
+                                  <p:childTnLst>
+                                    <p:set>
+                                      <p:cBhvr>
+                                        <p:cTn id="14" dur="1" fill="hold">
+                                          <p:stCondLst>
+                                            <p:cond delay="0"/>
+                                          </p:stCondLst>
+                                        </p:cTn>
+                                        <p:tgtEl>
+                                          <p:spTgt spid="2">
+                                            <p:txEl>
+                                              <p:pRg st="2" end="2"/>
+                                            </p:txEl>
+                                          </p:spTgt>
+                                        </p:tgtEl>
+                                        <p:attrNameLst>
+                                          <p:attrName>style.visibility</p:attrName>
+                                        </p:attrNameLst>
+                                      </p:cBhvr>
+                                      <p:to>
+                                        <p:strVal val="visible"/>
+                                      </p:to>
+                                    </p:set>
+                                  </p:childTnLst>
+                                </p:cTn>
+                              </p:par>
+                            </p:childTnLst>
+                          </p:cTn>
+                        </p:par>
+                      </p:childTnLst>
+                    </p:cTn>
+                  </p:par>
+                  <p:par>
+                    <p:cTn id="15" fill="hold">
+                      <p:stCondLst>
+                        <p:cond delay="indefinite"/>
+                      </p:stCondLst>
+                      <p:childTnLst>
+                        <p:par>
+                          <p:cTn id="16" fill="hold">
+                            <p:stCondLst>
+                              <p:cond delay="0"/>
+                            </p:stCondLst>
+                            <p:childTnLst>
+                              <p:par>
+                                <p:cTn id="17" presetID="1" presetClass="entr" presetSubtype="0" fill="hold" grpId="0" nodeType="clickEffect">
+                                  <p:stCondLst>
+                                    <p:cond delay="0"/>
+                                  </p:stCondLst>
+                                  <p:childTnLst>
+                                    <p:set>
+                                      <p:cBhvr>
+                                        <p:cTn id="18" dur="1" fill="hold">
+                                          <p:stCondLst>
+                                            <p:cond delay="0"/>
+                                          </p:stCondLst>
+                                        </p:cTn>
+                                        <p:tgtEl>
+                                          <p:spTgt spid="2">
+                                            <p:txEl>
+                                              <p:pRg st="4" end="4"/>
+                                            </p:txEl>
+                                          </p:spTgt>
+                                        </p:tgtEl>
+                                        <p:attrNameLst>
+                                          <p:attrName>style.visibility</p:attrName>
+                                        </p:attrNameLst>
+                                      </p:cBhvr>
+                                      <p:to>
+                                        <p:strVal val="visible"/>
+                                      </p:to>
+                                    </p:set>
+                                  </p:childTnLst>
+                                </p:cTn>
+                              </p:par>
+                            </p:childTnLst>
+                          </p:cTn>
+                        </p:par>
+                      </p:childTnLst>
+                    </p:cTn>
+                  </p:par>
+                </p:childTnLst>
+              </p:cTn>
+              <p:prevCondLst>
+                <p:cond evt="onPrev" delay="0">
+                  <p:tgtEl>
+                    <p:sldTgt/>
+                  </p:tgtEl>
+                </p:cond>
+              </p:prevCondLst>
+              <p:nextCondLst>
+                <p:cond evt="onNext" delay="0">
+                  <p:tgtEl>
+                    <p:sldTgt/>
+                  </p:tgtEl>
+                </p:cond>
+              </p:nextCondLst>
+            </p:seq>
+          </p:childTnLst>
+        </p:cTn>
       </p:par>
     </p:tnLst>
+    <p:bldLst>
+      <p:bldP spid="2" grpId="0" build="p"/>
+    </p:bldLst>
   </p:timing>
 </p:sld>
 </file>
@@ -6448,9 +7252,178 @@
   <p:timing>
     <p:tnLst>
       <p:par>
-        <p:cTn id="1" dur="indefinite" restart="never" nodeType="tmRoot"/>
+        <p:cTn id="1" dur="indefinite" restart="never" nodeType="tmRoot">
+          <p:childTnLst>
+            <p:seq concurrent="1" nextAc="seek">
+              <p:cTn id="2" dur="indefinite" nodeType="mainSeq">
+                <p:childTnLst>
+                  <p:par>
+                    <p:cTn id="3" fill="hold">
+                      <p:stCondLst>
+                        <p:cond delay="indefinite"/>
+                      </p:stCondLst>
+                      <p:childTnLst>
+                        <p:par>
+                          <p:cTn id="4" fill="hold">
+                            <p:stCondLst>
+                              <p:cond delay="0"/>
+                            </p:stCondLst>
+                            <p:childTnLst>
+                              <p:par>
+                                <p:cTn id="5" presetID="1" presetClass="entr" presetSubtype="0" fill="hold" grpId="0" nodeType="clickEffect">
+                                  <p:stCondLst>
+                                    <p:cond delay="0"/>
+                                  </p:stCondLst>
+                                  <p:childTnLst>
+                                    <p:set>
+                                      <p:cBhvr>
+                                        <p:cTn id="6" dur="1" fill="hold">
+                                          <p:stCondLst>
+                                            <p:cond delay="0"/>
+                                          </p:stCondLst>
+                                        </p:cTn>
+                                        <p:tgtEl>
+                                          <p:spTgt spid="5">
+                                            <p:txEl>
+                                              <p:pRg st="0" end="0"/>
+                                            </p:txEl>
+                                          </p:spTgt>
+                                        </p:tgtEl>
+                                        <p:attrNameLst>
+                                          <p:attrName>style.visibility</p:attrName>
+                                        </p:attrNameLst>
+                                      </p:cBhvr>
+                                      <p:to>
+                                        <p:strVal val="visible"/>
+                                      </p:to>
+                                    </p:set>
+                                  </p:childTnLst>
+                                </p:cTn>
+                              </p:par>
+                            </p:childTnLst>
+                          </p:cTn>
+                        </p:par>
+                      </p:childTnLst>
+                    </p:cTn>
+                  </p:par>
+                  <p:par>
+                    <p:cTn id="7" fill="hold">
+                      <p:stCondLst>
+                        <p:cond delay="indefinite"/>
+                      </p:stCondLst>
+                      <p:childTnLst>
+                        <p:par>
+                          <p:cTn id="8" fill="hold">
+                            <p:stCondLst>
+                              <p:cond delay="0"/>
+                            </p:stCondLst>
+                            <p:childTnLst>
+                              <p:par>
+                                <p:cTn id="9" presetID="1" presetClass="entr" presetSubtype="0" fill="hold" grpId="0" nodeType="clickEffect">
+                                  <p:stCondLst>
+                                    <p:cond delay="0"/>
+                                  </p:stCondLst>
+                                  <p:childTnLst>
+                                    <p:set>
+                                      <p:cBhvr>
+                                        <p:cTn id="10" dur="1" fill="hold">
+                                          <p:stCondLst>
+                                            <p:cond delay="0"/>
+                                          </p:stCondLst>
+                                        </p:cTn>
+                                        <p:tgtEl>
+                                          <p:spTgt spid="5">
+                                            <p:txEl>
+                                              <p:pRg st="1" end="1"/>
+                                            </p:txEl>
+                                          </p:spTgt>
+                                        </p:tgtEl>
+                                        <p:attrNameLst>
+                                          <p:attrName>style.visibility</p:attrName>
+                                        </p:attrNameLst>
+                                      </p:cBhvr>
+                                      <p:to>
+                                        <p:strVal val="visible"/>
+                                      </p:to>
+                                    </p:set>
+                                  </p:childTnLst>
+                                </p:cTn>
+                              </p:par>
+                            </p:childTnLst>
+                          </p:cTn>
+                        </p:par>
+                      </p:childTnLst>
+                    </p:cTn>
+                  </p:par>
+                  <p:par>
+                    <p:cTn id="11" fill="hold">
+                      <p:stCondLst>
+                        <p:cond delay="indefinite"/>
+                      </p:stCondLst>
+                      <p:childTnLst>
+                        <p:par>
+                          <p:cTn id="12" fill="hold">
+                            <p:stCondLst>
+                              <p:cond delay="0"/>
+                            </p:stCondLst>
+                            <p:childTnLst>
+                              <p:par>
+                                <p:cTn id="13" presetID="1" presetClass="entr" presetSubtype="0" fill="hold" nodeType="clickEffect">
+                                  <p:stCondLst>
+                                    <p:cond delay="0"/>
+                                  </p:stCondLst>
+                                  <p:childTnLst>
+                                    <p:set>
+                                      <p:cBhvr>
+                                        <p:cTn id="14" dur="1" fill="hold">
+                                          <p:stCondLst>
+                                            <p:cond delay="0"/>
+                                          </p:stCondLst>
+                                        </p:cTn>
+                                        <p:tgtEl>
+                                          <p:spTgt spid="6"/>
+                                        </p:tgtEl>
+                                        <p:attrNameLst>
+                                          <p:attrName>style.visibility</p:attrName>
+                                        </p:attrNameLst>
+                                      </p:cBhvr>
+                                      <p:to>
+                                        <p:strVal val="visible"/>
+                                      </p:to>
+                                    </p:set>
+                                  </p:childTnLst>
+                                </p:cTn>
+                              </p:par>
+                            </p:childTnLst>
+                          </p:cTn>
+                        </p:par>
+                      </p:childTnLst>
+                    </p:cTn>
+                  </p:par>
+                </p:childTnLst>
+              </p:cTn>
+              <p:prevCondLst>
+                <p:cond evt="onPrev" delay="0">
+                  <p:tgtEl>
+                    <p:sldTgt/>
+                  </p:tgtEl>
+                </p:cond>
+              </p:prevCondLst>
+              <p:nextCondLst>
+                <p:cond evt="onNext" delay="0">
+                  <p:tgtEl>
+                    <p:sldTgt/>
+                  </p:tgtEl>
+                </p:cond>
+              </p:nextCondLst>
+            </p:seq>
+          </p:childTnLst>
+        </p:cTn>
       </p:par>
     </p:tnLst>
+    <p:bldLst>
+      <p:bldP spid="5" grpId="0" build="p"/>
+    </p:bldLst>
   </p:timing>
 </p:sld>
 </file>
@@ -6591,9 +7564,178 @@
   <p:timing>
     <p:tnLst>
       <p:par>
-        <p:cTn id="1" dur="indefinite" restart="never" nodeType="tmRoot"/>
+        <p:cTn id="1" dur="indefinite" restart="never" nodeType="tmRoot">
+          <p:childTnLst>
+            <p:seq concurrent="1" nextAc="seek">
+              <p:cTn id="2" dur="indefinite" nodeType="mainSeq">
+                <p:childTnLst>
+                  <p:par>
+                    <p:cTn id="3" fill="hold">
+                      <p:stCondLst>
+                        <p:cond delay="indefinite"/>
+                      </p:stCondLst>
+                      <p:childTnLst>
+                        <p:par>
+                          <p:cTn id="4" fill="hold">
+                            <p:stCondLst>
+                              <p:cond delay="0"/>
+                            </p:stCondLst>
+                            <p:childTnLst>
+                              <p:par>
+                                <p:cTn id="5" presetID="1" presetClass="entr" presetSubtype="0" fill="hold" grpId="0" nodeType="clickEffect">
+                                  <p:stCondLst>
+                                    <p:cond delay="0"/>
+                                  </p:stCondLst>
+                                  <p:childTnLst>
+                                    <p:set>
+                                      <p:cBhvr>
+                                        <p:cTn id="6" dur="1" fill="hold">
+                                          <p:stCondLst>
+                                            <p:cond delay="0"/>
+                                          </p:stCondLst>
+                                        </p:cTn>
+                                        <p:tgtEl>
+                                          <p:spTgt spid="2">
+                                            <p:txEl>
+                                              <p:pRg st="0" end="0"/>
+                                            </p:txEl>
+                                          </p:spTgt>
+                                        </p:tgtEl>
+                                        <p:attrNameLst>
+                                          <p:attrName>style.visibility</p:attrName>
+                                        </p:attrNameLst>
+                                      </p:cBhvr>
+                                      <p:to>
+                                        <p:strVal val="visible"/>
+                                      </p:to>
+                                    </p:set>
+                                  </p:childTnLst>
+                                </p:cTn>
+                              </p:par>
+                            </p:childTnLst>
+                          </p:cTn>
+                        </p:par>
+                      </p:childTnLst>
+                    </p:cTn>
+                  </p:par>
+                  <p:par>
+                    <p:cTn id="7" fill="hold">
+                      <p:stCondLst>
+                        <p:cond delay="indefinite"/>
+                      </p:stCondLst>
+                      <p:childTnLst>
+                        <p:par>
+                          <p:cTn id="8" fill="hold">
+                            <p:stCondLst>
+                              <p:cond delay="0"/>
+                            </p:stCondLst>
+                            <p:childTnLst>
+                              <p:par>
+                                <p:cTn id="9" presetID="1" presetClass="entr" presetSubtype="0" fill="hold" grpId="0" nodeType="clickEffect">
+                                  <p:stCondLst>
+                                    <p:cond delay="0"/>
+                                  </p:stCondLst>
+                                  <p:childTnLst>
+                                    <p:set>
+                                      <p:cBhvr>
+                                        <p:cTn id="10" dur="1" fill="hold">
+                                          <p:stCondLst>
+                                            <p:cond delay="0"/>
+                                          </p:stCondLst>
+                                        </p:cTn>
+                                        <p:tgtEl>
+                                          <p:spTgt spid="2">
+                                            <p:txEl>
+                                              <p:pRg st="1" end="1"/>
+                                            </p:txEl>
+                                          </p:spTgt>
+                                        </p:tgtEl>
+                                        <p:attrNameLst>
+                                          <p:attrName>style.visibility</p:attrName>
+                                        </p:attrNameLst>
+                                      </p:cBhvr>
+                                      <p:to>
+                                        <p:strVal val="visible"/>
+                                      </p:to>
+                                    </p:set>
+                                  </p:childTnLst>
+                                </p:cTn>
+                              </p:par>
+                            </p:childTnLst>
+                          </p:cTn>
+                        </p:par>
+                      </p:childTnLst>
+                    </p:cTn>
+                  </p:par>
+                  <p:par>
+                    <p:cTn id="11" fill="hold">
+                      <p:stCondLst>
+                        <p:cond delay="indefinite"/>
+                      </p:stCondLst>
+                      <p:childTnLst>
+                        <p:par>
+                          <p:cTn id="12" fill="hold">
+                            <p:stCondLst>
+                              <p:cond delay="0"/>
+                            </p:stCondLst>
+                            <p:childTnLst>
+                              <p:par>
+                                <p:cTn id="13" presetID="1" presetClass="entr" presetSubtype="0" fill="hold" nodeType="clickEffect">
+                                  <p:stCondLst>
+                                    <p:cond delay="0"/>
+                                  </p:stCondLst>
+                                  <p:childTnLst>
+                                    <p:set>
+                                      <p:cBhvr>
+                                        <p:cTn id="14" dur="1" fill="hold">
+                                          <p:stCondLst>
+                                            <p:cond delay="0"/>
+                                          </p:stCondLst>
+                                        </p:cTn>
+                                        <p:tgtEl>
+                                          <p:spTgt spid="8"/>
+                                        </p:tgtEl>
+                                        <p:attrNameLst>
+                                          <p:attrName>style.visibility</p:attrName>
+                                        </p:attrNameLst>
+                                      </p:cBhvr>
+                                      <p:to>
+                                        <p:strVal val="visible"/>
+                                      </p:to>
+                                    </p:set>
+                                  </p:childTnLst>
+                                </p:cTn>
+                              </p:par>
+                            </p:childTnLst>
+                          </p:cTn>
+                        </p:par>
+                      </p:childTnLst>
+                    </p:cTn>
+                  </p:par>
+                </p:childTnLst>
+              </p:cTn>
+              <p:prevCondLst>
+                <p:cond evt="onPrev" delay="0">
+                  <p:tgtEl>
+                    <p:sldTgt/>
+                  </p:tgtEl>
+                </p:cond>
+              </p:prevCondLst>
+              <p:nextCondLst>
+                <p:cond evt="onNext" delay="0">
+                  <p:tgtEl>
+                    <p:sldTgt/>
+                  </p:tgtEl>
+                </p:cond>
+              </p:nextCondLst>
+            </p:seq>
+          </p:childTnLst>
+        </p:cTn>
       </p:par>
     </p:tnLst>
+    <p:bldLst>
+      <p:bldP spid="2" grpId="0" build="p"/>
+    </p:bldLst>
   </p:timing>
 </p:sld>
 </file>
@@ -6736,9 +7878,129 @@
   <p:timing>
     <p:tnLst>
       <p:par>
-        <p:cTn id="1" dur="indefinite" restart="never" nodeType="tmRoot"/>
+        <p:cTn id="1" dur="indefinite" restart="never" nodeType="tmRoot">
+          <p:childTnLst>
+            <p:seq concurrent="1" nextAc="seek">
+              <p:cTn id="2" dur="indefinite" nodeType="mainSeq">
+                <p:childTnLst>
+                  <p:par>
+                    <p:cTn id="3" fill="hold">
+                      <p:stCondLst>
+                        <p:cond delay="indefinite"/>
+                      </p:stCondLst>
+                      <p:childTnLst>
+                        <p:par>
+                          <p:cTn id="4" fill="hold">
+                            <p:stCondLst>
+                              <p:cond delay="0"/>
+                            </p:stCondLst>
+                            <p:childTnLst>
+                              <p:par>
+                                <p:cTn id="5" presetID="1" presetClass="entr" presetSubtype="0" fill="hold" grpId="0" nodeType="clickEffect">
+                                  <p:stCondLst>
+                                    <p:cond delay="0"/>
+                                  </p:stCondLst>
+                                  <p:childTnLst>
+                                    <p:set>
+                                      <p:cBhvr>
+                                        <p:cTn id="6" dur="1" fill="hold">
+                                          <p:stCondLst>
+                                            <p:cond delay="0"/>
+                                          </p:stCondLst>
+                                        </p:cTn>
+                                        <p:tgtEl>
+                                          <p:spTgt spid="2">
+                                            <p:txEl>
+                                              <p:pRg st="0" end="0"/>
+                                            </p:txEl>
+                                          </p:spTgt>
+                                        </p:tgtEl>
+                                        <p:attrNameLst>
+                                          <p:attrName>style.visibility</p:attrName>
+                                        </p:attrNameLst>
+                                      </p:cBhvr>
+                                      <p:to>
+                                        <p:strVal val="visible"/>
+                                      </p:to>
+                                    </p:set>
+                                  </p:childTnLst>
+                                </p:cTn>
+                              </p:par>
+                            </p:childTnLst>
+                          </p:cTn>
+                        </p:par>
+                      </p:childTnLst>
+                    </p:cTn>
+                  </p:par>
+                  <p:par>
+                    <p:cTn id="7" fill="hold">
+                      <p:stCondLst>
+                        <p:cond delay="indefinite"/>
+                      </p:stCondLst>
+                      <p:childTnLst>
+                        <p:par>
+                          <p:cTn id="8" fill="hold">
+                            <p:stCondLst>
+                              <p:cond delay="0"/>
+                            </p:stCondLst>
+                            <p:childTnLst>
+                              <p:par>
+                                <p:cTn id="9" presetID="1" presetClass="entr" presetSubtype="0" fill="hold" nodeType="clickEffect">
+                                  <p:stCondLst>
+                                    <p:cond delay="0"/>
+                                  </p:stCondLst>
+                                  <p:childTnLst>
+                                    <p:set>
+                                      <p:cBhvr>
+                                        <p:cTn id="10" dur="1" fill="hold">
+                                          <p:stCondLst>
+                                            <p:cond delay="0"/>
+                                          </p:stCondLst>
+                                        </p:cTn>
+                                        <p:tgtEl>
+                                          <p:spTgt spid="5"/>
+                                        </p:tgtEl>
+                                        <p:attrNameLst>
+                                          <p:attrName>style.visibility</p:attrName>
+                                        </p:attrNameLst>
+                                      </p:cBhvr>
+                                      <p:to>
+                                        <p:strVal val="visible"/>
+                                      </p:to>
+                                    </p:set>
+                                  </p:childTnLst>
+                                </p:cTn>
+                              </p:par>
+                            </p:childTnLst>
+                          </p:cTn>
+                        </p:par>
+                      </p:childTnLst>
+                    </p:cTn>
+                  </p:par>
+                </p:childTnLst>
+              </p:cTn>
+              <p:prevCondLst>
+                <p:cond evt="onPrev" delay="0">
+                  <p:tgtEl>
+                    <p:sldTgt/>
+                  </p:tgtEl>
+                </p:cond>
+              </p:prevCondLst>
+              <p:nextCondLst>
+                <p:cond evt="onNext" delay="0">
+                  <p:tgtEl>
+                    <p:sldTgt/>
+                  </p:tgtEl>
+                </p:cond>
+              </p:nextCondLst>
+            </p:seq>
+          </p:childTnLst>
+        </p:cTn>
       </p:par>
     </p:tnLst>
+    <p:bldLst>
+      <p:bldP spid="2" grpId="0" build="p"/>
+    </p:bldLst>
   </p:timing>
 </p:sld>
 </file>

</xml_diff>